<commit_message>
finished servie discovery and circuit breaker
</commit_message>
<xml_diff>
--- a/presentations/Session_7_SC_Discovery_LB.pptx
+++ b/presentations/Session_7_SC_Discovery_LB.pptx
@@ -231,7 +231,7 @@
           <a:p>
             <a:fld id="{372E5B6B-8713-8747-AE5B-F1241B2BF5F0}" type="datetimeFigureOut">
               <a:rPr lang="en-US" smtClean="0"/>
-              <a:t>4/5/16</a:t>
+              <a:t>4/6/16</a:t>
             </a:fld>
             <a:endParaRPr lang="en-US"/>
           </a:p>
@@ -397,7 +397,7 @@
           <a:p>
             <a:fld id="{7E7B7340-DDD5-1B49-81AA-25BC4050C073}" type="datetimeFigureOut">
               <a:rPr lang="en-US" smtClean="0"/>
-              <a:t>4/5/16</a:t>
+              <a:t>4/6/16</a:t>
             </a:fld>
             <a:endParaRPr lang="en-US"/>
           </a:p>
@@ -9869,10 +9869,6 @@
               </a:rPr>
               <a:t>   </a:t>
             </a:r>
-            <a:endParaRPr lang="en-US" sz="1100" dirty="0" smtClean="0">
-              <a:latin typeface="Courier New"/>
-              <a:cs typeface="Courier New"/>
-            </a:endParaRPr>
           </a:p>
           <a:p>
             <a:r>
@@ -10090,14 +10086,7 @@
                 <a:latin typeface="Courier New"/>
                 <a:cs typeface="Courier New"/>
               </a:rPr>
-              <a:t>serviceId: users_service </a:t>
-            </a:r>
-            <a:r>
-              <a:rPr lang="en-US" sz="1200" dirty="0">
-                <a:latin typeface="Courier New"/>
-                <a:cs typeface="Courier New"/>
-              </a:rPr>
-              <a:t> </a:t>
+              <a:t>serviceId: users_service  </a:t>
             </a:r>
           </a:p>
         </p:txBody>
@@ -10282,11 +10271,7 @@
             </a:r>
             <a:r>
               <a:rPr lang="en-US" sz="1800" b="1" dirty="0"/>
-              <a:t>are executed in a </a:t>
-            </a:r>
-            <a:r>
-              <a:rPr lang="en-US" sz="1800" b="1" dirty="0"/>
-              <a:t>H</a:t>
+              <a:t>are executed in a H</a:t>
             </a:r>
             <a:r>
               <a:rPr lang="en-US" sz="1800" b="1" dirty="0" smtClean="0"/>
@@ -10348,78 +10333,6 @@
                                           </p:stCondLst>
                                         </p:cTn>
                                         <p:tgtEl>
-                                          <p:spTgt spid="12"/>
-                                        </p:tgtEl>
-                                        <p:attrNameLst>
-                                          <p:attrName>style.visibility</p:attrName>
-                                        </p:attrNameLst>
-                                      </p:cBhvr>
-                                      <p:to>
-                                        <p:strVal val="visible"/>
-                                      </p:to>
-                                    </p:set>
-                                  </p:childTnLst>
-                                </p:cTn>
-                              </p:par>
-                              <p:par>
-                                <p:cTn id="7" presetID="1" presetClass="entr" presetSubtype="0" fill="hold" grpId="0" nodeType="withEffect">
-                                  <p:stCondLst>
-                                    <p:cond delay="0"/>
-                                  </p:stCondLst>
-                                  <p:childTnLst>
-                                    <p:set>
-                                      <p:cBhvr>
-                                        <p:cTn id="8" dur="1" fill="hold">
-                                          <p:stCondLst>
-                                            <p:cond delay="0"/>
-                                          </p:stCondLst>
-                                        </p:cTn>
-                                        <p:tgtEl>
-                                          <p:spTgt spid="11"/>
-                                        </p:tgtEl>
-                                        <p:attrNameLst>
-                                          <p:attrName>style.visibility</p:attrName>
-                                        </p:attrNameLst>
-                                      </p:cBhvr>
-                                      <p:to>
-                                        <p:strVal val="visible"/>
-                                      </p:to>
-                                    </p:set>
-                                  </p:childTnLst>
-                                </p:cTn>
-                              </p:par>
-                            </p:childTnLst>
-                          </p:cTn>
-                        </p:par>
-                      </p:childTnLst>
-                    </p:cTn>
-                  </p:par>
-                  <p:par>
-                    <p:cTn id="9" fill="hold">
-                      <p:stCondLst>
-                        <p:cond delay="indefinite"/>
-                      </p:stCondLst>
-                      <p:childTnLst>
-                        <p:par>
-                          <p:cTn id="10" fill="hold">
-                            <p:stCondLst>
-                              <p:cond delay="0"/>
-                            </p:stCondLst>
-                            <p:childTnLst>
-                              <p:par>
-                                <p:cTn id="11" presetID="1" presetClass="entr" presetSubtype="0" fill="hold" grpId="0" nodeType="clickEffect">
-                                  <p:stCondLst>
-                                    <p:cond delay="0"/>
-                                  </p:stCondLst>
-                                  <p:childTnLst>
-                                    <p:set>
-                                      <p:cBhvr>
-                                        <p:cTn id="12" dur="1" fill="hold">
-                                          <p:stCondLst>
-                                            <p:cond delay="0"/>
-                                          </p:stCondLst>
-                                        </p:cTn>
-                                        <p:tgtEl>
                                           <p:spTgt spid="6"/>
                                         </p:tgtEl>
                                         <p:attrNameLst>
@@ -10434,14 +10347,14 @@
                                 </p:cTn>
                               </p:par>
                               <p:par>
-                                <p:cTn id="13" presetID="1" presetClass="entr" presetSubtype="0" fill="hold" nodeType="withEffect">
+                                <p:cTn id="7" presetID="1" presetClass="entr" presetSubtype="0" fill="hold" nodeType="withEffect">
                                   <p:stCondLst>
                                     <p:cond delay="0"/>
                                   </p:stCondLst>
                                   <p:childTnLst>
                                     <p:set>
                                       <p:cBhvr>
-                                        <p:cTn id="14" dur="1" fill="hold">
+                                        <p:cTn id="8" dur="1" fill="hold">
                                           <p:stCondLst>
                                             <p:cond delay="0"/>
                                           </p:stCondLst>
@@ -10488,8 +10401,6 @@
       </p:par>
     </p:tnLst>
     <p:bldLst>
-      <p:bldP spid="11" grpId="0" animBg="1"/>
-      <p:bldP spid="12" grpId="0"/>
       <p:bldP spid="6" grpId="0"/>
     </p:bldLst>
   </p:timing>
@@ -11226,15 +11137,7 @@
             <a:pPr lvl="0" fontAlgn="base"/>
             <a:r>
               <a:rPr lang="en-US" sz="1800" b="1" dirty="0" smtClean="0"/>
-              <a:t>Registry server collects heartbeats, maintains registry of available services/instances, exchanges registries with loca</a:t>
-            </a:r>
-            <a:r>
-              <a:rPr lang="en-US" sz="1800" b="1" dirty="0" smtClean="0"/>
-              <a:t>l peers + </a:t>
-            </a:r>
-            <a:r>
-              <a:rPr lang="en-US" sz="1800" b="1" dirty="0" smtClean="0"/>
-              <a:t>other “zones”</a:t>
+              <a:t>Registry server collects heartbeats, maintains registry of available services/instances, exchanges registries with local peers + other “zones”</a:t>
             </a:r>
           </a:p>
           <a:p>
@@ -11834,7 +11737,6 @@
                 <a:rPr lang="en-US" sz="1400" dirty="0"/>
                 <a:t>Service Registry</a:t>
               </a:r>
-              <a:endParaRPr lang="en-US" sz="1400" dirty="0"/>
             </a:p>
           </p:txBody>
         </p:sp>
@@ -13367,17 +13269,7 @@
                 <a:latin typeface="Courier New"/>
                 <a:cs typeface="Courier New"/>
               </a:rPr>
-              <a:t>@</a:t>
-            </a:r>
-            <a:r>
-              <a:rPr lang="en-US" sz="1200" b="1" dirty="0" smtClean="0">
-                <a:solidFill>
-                  <a:srgbClr val="008774"/>
-                </a:solidFill>
-                <a:latin typeface="Courier New"/>
-                <a:cs typeface="Courier New"/>
-              </a:rPr>
-              <a:t>EnableDiscoveryClient</a:t>
+              <a:t>@EnableDiscoveryClient</a:t>
             </a:r>
             <a:endParaRPr lang="en-US" sz="1200" b="1" dirty="0" smtClean="0">
               <a:solidFill>
@@ -13419,10 +13311,6 @@
               </a:rPr>
               <a:t>{</a:t>
             </a:r>
-            <a:endParaRPr lang="en-US" sz="1200" dirty="0" smtClean="0">
-              <a:latin typeface="Courier New"/>
-              <a:cs typeface="Courier New"/>
-            </a:endParaRPr>
           </a:p>
           <a:p>
             <a:r>
@@ -13486,14 +13374,7 @@
                 <a:latin typeface="Courier New"/>
                 <a:cs typeface="Courier New"/>
               </a:rPr>
-              <a:t>     SpringApplication.run</a:t>
-            </a:r>
-            <a:r>
-              <a:rPr lang="en-US" sz="1200" dirty="0" smtClean="0">
-                <a:latin typeface="Courier New"/>
-                <a:cs typeface="Courier New"/>
-              </a:rPr>
-              <a:t>(MyClientApp</a:t>
+              <a:t>     SpringApplication.run(MyClientApp</a:t>
             </a:r>
             <a:r>
               <a:rPr lang="en-US" sz="1200" dirty="0" smtClean="0">
@@ -14164,11 +14045,7 @@
           <a:p>
             <a:r>
               <a:rPr lang="en-US" dirty="0" smtClean="0"/>
-              <a:t>Spring Cloud Services: </a:t>
-            </a:r>
-            <a:r>
-              <a:rPr lang="en-US" dirty="0" smtClean="0"/>
-              <a:t>Service Registry</a:t>
+              <a:t>Spring Cloud Services: Service Registry</a:t>
             </a:r>
             <a:endParaRPr lang="en-US" dirty="0">
               <a:solidFill>
@@ -14210,15 +14087,7 @@
                   <a:srgbClr val="FFFFFF"/>
                 </a:solidFill>
               </a:rPr>
-              <a:t>Automated deployment of server </a:t>
-            </a:r>
-            <a:r>
-              <a:rPr lang="en-US" dirty="0" smtClean="0">
-                <a:solidFill>
-                  <a:srgbClr val="FFFFFF"/>
-                </a:solidFill>
-              </a:rPr>
-              <a:t>component</a:t>
+              <a:t>Automated deployment of server component</a:t>
             </a:r>
             <a:br>
               <a:rPr lang="en-US" dirty="0" smtClean="0">
@@ -14269,21 +14138,8 @@
                   <a:srgbClr val="FFFFFF"/>
                 </a:solidFill>
               </a:rPr>
-              <a:t>Bind into CF </a:t>
-            </a:r>
-            <a:r>
-              <a:rPr lang="en-US" dirty="0" smtClean="0">
-                <a:solidFill>
-                  <a:srgbClr val="FFFFFF"/>
-                </a:solidFill>
-              </a:rPr>
-              <a:t>client application(s)</a:t>
-            </a:r>
-            <a:endParaRPr lang="en-US" dirty="0" smtClean="0">
-              <a:solidFill>
-                <a:srgbClr val="FFFFFF"/>
-              </a:solidFill>
-            </a:endParaRPr>
+              <a:t>Bind into CF client application(s)</a:t>
+            </a:r>
           </a:p>
         </p:txBody>
       </p:sp>

</xml_diff>